<commit_message>
Updated UI Component and my adoc
</commit_message>
<xml_diff>
--- a/docs/diagrams/UiComponentClassDiagram.pptx
+++ b/docs/diagrams/UiComponentClassDiagram.pptx
@@ -208,7 +208,7 @@
           <a:p>
             <a:fld id="{F5CC4B3F-88C1-4FFA-B1B6-F41C21DC6924}" type="datetimeFigureOut">
               <a:rPr lang="en-US" smtClean="0"/>
-              <a:t>1/7/2017</a:t>
+              <a:t>11/10/2018</a:t>
             </a:fld>
             <a:endParaRPr lang="en-US"/>
           </a:p>
@@ -654,7 +654,7 @@
           <a:p>
             <a:fld id="{78C97017-6FC3-485B-9764-EAC9E56C1D49}" type="datetimeFigureOut">
               <a:rPr lang="en-US" smtClean="0"/>
-              <a:t>1/7/2017</a:t>
+              <a:t>11/10/2018</a:t>
             </a:fld>
             <a:endParaRPr lang="en-US"/>
           </a:p>
@@ -822,7 +822,7 @@
           <a:p>
             <a:fld id="{78C97017-6FC3-485B-9764-EAC9E56C1D49}" type="datetimeFigureOut">
               <a:rPr lang="en-US" smtClean="0"/>
-              <a:t>1/7/2017</a:t>
+              <a:t>11/10/2018</a:t>
             </a:fld>
             <a:endParaRPr lang="en-US"/>
           </a:p>
@@ -1000,7 +1000,7 @@
           <a:p>
             <a:fld id="{78C97017-6FC3-485B-9764-EAC9E56C1D49}" type="datetimeFigureOut">
               <a:rPr lang="en-US" smtClean="0"/>
-              <a:t>1/7/2017</a:t>
+              <a:t>11/10/2018</a:t>
             </a:fld>
             <a:endParaRPr lang="en-US"/>
           </a:p>
@@ -1168,7 +1168,7 @@
           <a:p>
             <a:fld id="{78C97017-6FC3-485B-9764-EAC9E56C1D49}" type="datetimeFigureOut">
               <a:rPr lang="en-US" smtClean="0"/>
-              <a:t>1/7/2017</a:t>
+              <a:t>11/10/2018</a:t>
             </a:fld>
             <a:endParaRPr lang="en-US"/>
           </a:p>
@@ -1413,7 +1413,7 @@
           <a:p>
             <a:fld id="{78C97017-6FC3-485B-9764-EAC9E56C1D49}" type="datetimeFigureOut">
               <a:rPr lang="en-US" smtClean="0"/>
-              <a:t>1/7/2017</a:t>
+              <a:t>11/10/2018</a:t>
             </a:fld>
             <a:endParaRPr lang="en-US"/>
           </a:p>
@@ -1698,7 +1698,7 @@
           <a:p>
             <a:fld id="{78C97017-6FC3-485B-9764-EAC9E56C1D49}" type="datetimeFigureOut">
               <a:rPr lang="en-US" smtClean="0"/>
-              <a:t>1/7/2017</a:t>
+              <a:t>11/10/2018</a:t>
             </a:fld>
             <a:endParaRPr lang="en-US"/>
           </a:p>
@@ -2117,7 +2117,7 @@
           <a:p>
             <a:fld id="{78C97017-6FC3-485B-9764-EAC9E56C1D49}" type="datetimeFigureOut">
               <a:rPr lang="en-US" smtClean="0"/>
-              <a:t>1/7/2017</a:t>
+              <a:t>11/10/2018</a:t>
             </a:fld>
             <a:endParaRPr lang="en-US"/>
           </a:p>
@@ -2234,7 +2234,7 @@
           <a:p>
             <a:fld id="{78C97017-6FC3-485B-9764-EAC9E56C1D49}" type="datetimeFigureOut">
               <a:rPr lang="en-US" smtClean="0"/>
-              <a:t>1/7/2017</a:t>
+              <a:t>11/10/2018</a:t>
             </a:fld>
             <a:endParaRPr lang="en-US"/>
           </a:p>
@@ -2329,7 +2329,7 @@
           <a:p>
             <a:fld id="{78C97017-6FC3-485B-9764-EAC9E56C1D49}" type="datetimeFigureOut">
               <a:rPr lang="en-US" smtClean="0"/>
-              <a:t>1/7/2017</a:t>
+              <a:t>11/10/2018</a:t>
             </a:fld>
             <a:endParaRPr lang="en-US"/>
           </a:p>
@@ -2604,7 +2604,7 @@
           <a:p>
             <a:fld id="{78C97017-6FC3-485B-9764-EAC9E56C1D49}" type="datetimeFigureOut">
               <a:rPr lang="en-US" smtClean="0"/>
-              <a:t>1/7/2017</a:t>
+              <a:t>11/10/2018</a:t>
             </a:fld>
             <a:endParaRPr lang="en-US"/>
           </a:p>
@@ -2856,7 +2856,7 @@
           <a:p>
             <a:fld id="{78C97017-6FC3-485B-9764-EAC9E56C1D49}" type="datetimeFigureOut">
               <a:rPr lang="en-US" smtClean="0"/>
-              <a:t>1/7/2017</a:t>
+              <a:t>11/10/2018</a:t>
             </a:fld>
             <a:endParaRPr lang="en-US"/>
           </a:p>
@@ -3067,7 +3067,7 @@
           <a:p>
             <a:fld id="{78C97017-6FC3-485B-9764-EAC9E56C1D49}" type="datetimeFigureOut">
               <a:rPr lang="en-US" smtClean="0"/>
-              <a:t>1/7/2017</a:t>
+              <a:t>11/10/2018</a:t>
             </a:fld>
             <a:endParaRPr lang="en-US"/>
           </a:p>
@@ -3451,7 +3451,7 @@
         <p:spPr>
           <a:xfrm>
             <a:off x="1217465" y="1447800"/>
-            <a:ext cx="4917083" cy="3962400"/>
+            <a:ext cx="4954735" cy="4572000"/>
           </a:xfrm>
           <a:prstGeom prst="roundRect">
             <a:avLst>
@@ -3925,7 +3925,7 @@
                   </a:schemeClr>
                 </a:solidFill>
               </a:rPr>
-              <a:t>BrowserPanel</a:t>
+              <a:t>ImageView</a:t>
             </a:r>
             <a:endParaRPr lang="en-SG" sz="1050" b="1" dirty="0">
               <a:solidFill>
@@ -3945,7 +3945,7 @@
         </p:nvSpPr>
         <p:spPr>
           <a:xfrm>
-            <a:off x="2592527" y="4563759"/>
+            <a:off x="2585125" y="5173357"/>
             <a:ext cx="1093635" cy="236841"/>
           </a:xfrm>
           <a:prstGeom prst="rect">
@@ -4125,7 +4125,7 @@
         </p:nvSpPr>
         <p:spPr>
           <a:xfrm>
-            <a:off x="2592528" y="4966000"/>
+            <a:off x="2586346" y="5558470"/>
             <a:ext cx="1093635" cy="236841"/>
           </a:xfrm>
           <a:prstGeom prst="rect">
@@ -4419,8 +4419,8 @@
         </p:nvCxnSpPr>
         <p:spPr>
           <a:xfrm rot="16200000" flipH="1">
-            <a:off x="1597249" y="3686901"/>
-            <a:ext cx="1814155" cy="176401"/>
+            <a:off x="1288749" y="3995401"/>
+            <a:ext cx="2423753" cy="168999"/>
           </a:xfrm>
           <a:prstGeom prst="bentConnector2">
             <a:avLst/>
@@ -4453,17 +4453,19 @@
         <p:nvCxnSpPr>
           <p:cNvPr id="53" name="Elbow Connector 63"/>
           <p:cNvCxnSpPr>
-            <a:endCxn id="38" idx="1"/>
+            <a:cxnSpLocks/>
           </p:cNvCxnSpPr>
           <p:nvPr/>
         </p:nvCxnSpPr>
         <p:spPr>
           <a:xfrm rot="16200000" flipH="1">
-            <a:off x="1184119" y="3676012"/>
-            <a:ext cx="2396440" cy="420377"/>
-          </a:xfrm>
-          <a:prstGeom prst="bentConnector2">
-            <a:avLst/>
+            <a:off x="877206" y="3989391"/>
+            <a:ext cx="2992081" cy="426199"/>
+          </a:xfrm>
+          <a:prstGeom prst="bentConnector3">
+            <a:avLst>
+              <a:gd name="adj1" fmla="val 100006"/>
+            </a:avLst>
           </a:prstGeom>
           <a:ln w="19050">
             <a:solidFill>
@@ -4743,8 +4745,8 @@
         </p:nvCxnSpPr>
         <p:spPr>
           <a:xfrm rot="5400000">
-            <a:off x="3409976" y="2562187"/>
-            <a:ext cx="2396180" cy="1843807"/>
+            <a:off x="3101476" y="2863285"/>
+            <a:ext cx="3005778" cy="1851209"/>
           </a:xfrm>
           <a:prstGeom prst="bentConnector2">
             <a:avLst/>
@@ -4784,8 +4786,8 @@
         </p:nvCxnSpPr>
         <p:spPr>
           <a:xfrm rot="5400000">
-            <a:off x="3208856" y="2763307"/>
-            <a:ext cx="2798421" cy="1843806"/>
+            <a:off x="2909530" y="3056451"/>
+            <a:ext cx="3390891" cy="1849988"/>
           </a:xfrm>
           <a:prstGeom prst="bentConnector2">
             <a:avLst/>
@@ -5436,6 +5438,314 @@
         <p:spPr>
           <a:xfrm flipV="1">
             <a:off x="4114799" y="4472708"/>
+            <a:ext cx="2642195" cy="101600"/>
+          </a:xfrm>
+          <a:custGeom>
+            <a:avLst/>
+            <a:gdLst>
+              <a:gd name="connsiteX0" fmla="*/ 0 w 3048000"/>
+              <a:gd name="connsiteY0" fmla="*/ 203200 h 203200"/>
+              <a:gd name="connsiteX1" fmla="*/ 221673 w 3048000"/>
+              <a:gd name="connsiteY1" fmla="*/ 0 h 203200"/>
+              <a:gd name="connsiteX2" fmla="*/ 3048000 w 3048000"/>
+              <a:gd name="connsiteY2" fmla="*/ 0 h 203200"/>
+            </a:gdLst>
+            <a:ahLst/>
+            <a:cxnLst>
+              <a:cxn ang="0">
+                <a:pos x="connsiteX0" y="connsiteY0"/>
+              </a:cxn>
+              <a:cxn ang="0">
+                <a:pos x="connsiteX1" y="connsiteY1"/>
+              </a:cxn>
+              <a:cxn ang="0">
+                <a:pos x="connsiteX2" y="connsiteY2"/>
+              </a:cxn>
+            </a:cxnLst>
+            <a:rect l="l" t="t" r="r" b="b"/>
+            <a:pathLst>
+              <a:path w="3048000" h="203200">
+                <a:moveTo>
+                  <a:pt x="0" y="203200"/>
+                </a:moveTo>
+                <a:lnTo>
+                  <a:pt x="221673" y="0"/>
+                </a:lnTo>
+                <a:lnTo>
+                  <a:pt x="3048000" y="0"/>
+                </a:lnTo>
+              </a:path>
+            </a:pathLst>
+          </a:custGeom>
+          <a:noFill/>
+          <a:ln w="19050">
+            <a:solidFill>
+              <a:schemeClr val="accent3"/>
+            </a:solidFill>
+            <a:prstDash val="sysDot"/>
+            <a:headEnd type="none" w="med" len="med"/>
+            <a:tailEnd type="arrow" w="med" len="med"/>
+          </a:ln>
+          <a:effectLst/>
+        </p:spPr>
+        <p:style>
+          <a:lnRef idx="1">
+            <a:schemeClr val="accent2"/>
+          </a:lnRef>
+          <a:fillRef idx="2">
+            <a:schemeClr val="accent2"/>
+          </a:fillRef>
+          <a:effectRef idx="1">
+            <a:schemeClr val="accent2"/>
+          </a:effectRef>
+          <a:fontRef idx="minor">
+            <a:schemeClr val="dk1"/>
+          </a:fontRef>
+        </p:style>
+        <p:txBody>
+          <a:bodyPr rtlCol="0" anchor="ctr"/>
+          <a:lstStyle/>
+          <a:p>
+            <a:pPr algn="ctr"/>
+            <a:endParaRPr lang="en-SG"/>
+          </a:p>
+        </p:txBody>
+      </p:sp>
+      <p:sp>
+        <p:nvSpPr>
+          <p:cNvPr id="49" name="Rectangle 11">
+            <a:extLst>
+              <a:ext uri="{FF2B5EF4-FFF2-40B4-BE49-F238E27FC236}">
+                <a16:creationId xmlns:a16="http://schemas.microsoft.com/office/drawing/2014/main" id="{BC39AB02-4A59-4DC2-BD7C-56A484B11216}"/>
+              </a:ext>
+            </a:extLst>
+          </p:cNvPr>
+          <p:cNvSpPr/>
+          <p:nvPr/>
+        </p:nvSpPr>
+        <p:spPr>
+          <a:xfrm>
+            <a:off x="2594892" y="4678978"/>
+            <a:ext cx="1093635" cy="236841"/>
+          </a:xfrm>
+          <a:prstGeom prst="rect">
+            <a:avLst/>
+          </a:prstGeom>
+          <a:ln w="19050">
+            <a:solidFill>
+              <a:schemeClr val="accent3"/>
+            </a:solidFill>
+          </a:ln>
+          <a:effectLst/>
+        </p:spPr>
+        <p:style>
+          <a:lnRef idx="1">
+            <a:schemeClr val="accent3"/>
+          </a:lnRef>
+          <a:fillRef idx="2">
+            <a:schemeClr val="accent3"/>
+          </a:fillRef>
+          <a:effectRef idx="1">
+            <a:schemeClr val="accent3"/>
+          </a:effectRef>
+          <a:fontRef idx="minor">
+            <a:schemeClr val="dk1"/>
+          </a:fontRef>
+        </p:style>
+        <p:txBody>
+          <a:bodyPr rtlCol="0" anchor="ctr"/>
+          <a:lstStyle/>
+          <a:p>
+            <a:pPr algn="ctr"/>
+            <a:r>
+              <a:rPr lang="en-US" sz="1050" b="1" dirty="0" err="1">
+                <a:solidFill>
+                  <a:schemeClr val="accent3">
+                    <a:lumMod val="75000"/>
+                  </a:schemeClr>
+                </a:solidFill>
+              </a:rPr>
+              <a:t>LeaveListPanel</a:t>
+            </a:r>
+            <a:endParaRPr lang="en-SG" sz="1050" b="1" dirty="0">
+              <a:solidFill>
+                <a:schemeClr val="accent3">
+                  <a:lumMod val="75000"/>
+                </a:schemeClr>
+              </a:solidFill>
+            </a:endParaRPr>
+          </a:p>
+        </p:txBody>
+      </p:sp>
+      <p:cxnSp>
+        <p:nvCxnSpPr>
+          <p:cNvPr id="51" name="Elbow Connector 63">
+            <a:extLst>
+              <a:ext uri="{FF2B5EF4-FFF2-40B4-BE49-F238E27FC236}">
+                <a16:creationId xmlns:a16="http://schemas.microsoft.com/office/drawing/2014/main" id="{9F63C379-19AD-4996-9A8D-2CEF32772F59}"/>
+              </a:ext>
+            </a:extLst>
+          </p:cNvPr>
+          <p:cNvCxnSpPr/>
+          <p:nvPr/>
+        </p:nvCxnSpPr>
+        <p:spPr>
+          <a:xfrm rot="16200000" flipH="1">
+            <a:off x="1883145" y="4118973"/>
+            <a:ext cx="1242356" cy="176400"/>
+          </a:xfrm>
+          <a:prstGeom prst="bentConnector2">
+            <a:avLst/>
+          </a:prstGeom>
+          <a:ln w="19050">
+            <a:solidFill>
+              <a:schemeClr val="accent3"/>
+            </a:solidFill>
+            <a:headEnd type="none" w="med" len="med"/>
+            <a:tailEnd type="arrow" w="med" len="med"/>
+          </a:ln>
+          <a:effectLst/>
+        </p:spPr>
+        <p:style>
+          <a:lnRef idx="1">
+            <a:schemeClr val="accent2"/>
+          </a:lnRef>
+          <a:fillRef idx="2">
+            <a:schemeClr val="accent2"/>
+          </a:fillRef>
+          <a:effectRef idx="1">
+            <a:schemeClr val="accent2"/>
+          </a:effectRef>
+          <a:fontRef idx="minor">
+            <a:schemeClr val="dk1"/>
+          </a:fontRef>
+        </p:style>
+      </p:cxnSp>
+      <p:cxnSp>
+        <p:nvCxnSpPr>
+          <p:cNvPr id="52" name="Elbow Connector 136">
+            <a:extLst>
+              <a:ext uri="{FF2B5EF4-FFF2-40B4-BE49-F238E27FC236}">
+                <a16:creationId xmlns:a16="http://schemas.microsoft.com/office/drawing/2014/main" id="{FF364986-097C-44F7-896C-56712936539C}"/>
+              </a:ext>
+            </a:extLst>
+          </p:cNvPr>
+          <p:cNvCxnSpPr/>
+          <p:nvPr/>
+        </p:nvCxnSpPr>
+        <p:spPr>
+          <a:xfrm rot="16200000" flipH="1">
+            <a:off x="3435009" y="4635265"/>
+            <a:ext cx="118421" cy="699979"/>
+          </a:xfrm>
+          <a:prstGeom prst="bentConnector2">
+            <a:avLst/>
+          </a:prstGeom>
+          <a:ln w="19050">
+            <a:solidFill>
+              <a:schemeClr val="accent3"/>
+            </a:solidFill>
+            <a:headEnd type="none" w="med" len="med"/>
+            <a:tailEnd type="arrow" w="med" len="med"/>
+          </a:ln>
+          <a:effectLst/>
+        </p:spPr>
+        <p:style>
+          <a:lnRef idx="1">
+            <a:schemeClr val="accent2"/>
+          </a:lnRef>
+          <a:fillRef idx="2">
+            <a:schemeClr val="accent2"/>
+          </a:fillRef>
+          <a:effectRef idx="1">
+            <a:schemeClr val="accent2"/>
+          </a:effectRef>
+          <a:fontRef idx="minor">
+            <a:schemeClr val="dk1"/>
+          </a:fontRef>
+        </p:style>
+      </p:cxnSp>
+      <p:sp>
+        <p:nvSpPr>
+          <p:cNvPr id="54" name="Rectangle 11">
+            <a:extLst>
+              <a:ext uri="{FF2B5EF4-FFF2-40B4-BE49-F238E27FC236}">
+                <a16:creationId xmlns:a16="http://schemas.microsoft.com/office/drawing/2014/main" id="{50D83EFA-593C-49D4-A29F-5EE563C2056C}"/>
+              </a:ext>
+            </a:extLst>
+          </p:cNvPr>
+          <p:cNvSpPr/>
+          <p:nvPr/>
+        </p:nvSpPr>
+        <p:spPr>
+          <a:xfrm>
+            <a:off x="3839323" y="4860235"/>
+            <a:ext cx="1040906" cy="236841"/>
+          </a:xfrm>
+          <a:prstGeom prst="rect">
+            <a:avLst/>
+          </a:prstGeom>
+          <a:ln w="19050">
+            <a:solidFill>
+              <a:schemeClr val="accent3"/>
+            </a:solidFill>
+          </a:ln>
+          <a:effectLst/>
+        </p:spPr>
+        <p:style>
+          <a:lnRef idx="1">
+            <a:schemeClr val="accent3"/>
+          </a:lnRef>
+          <a:fillRef idx="2">
+            <a:schemeClr val="accent3"/>
+          </a:fillRef>
+          <a:effectRef idx="1">
+            <a:schemeClr val="accent3"/>
+          </a:effectRef>
+          <a:fontRef idx="minor">
+            <a:schemeClr val="dk1"/>
+          </a:fontRef>
+        </p:style>
+        <p:txBody>
+          <a:bodyPr rtlCol="0" anchor="ctr"/>
+          <a:lstStyle/>
+          <a:p>
+            <a:pPr algn="ctr"/>
+            <a:r>
+              <a:rPr lang="en-US" sz="1050" b="1" dirty="0" err="1">
+                <a:solidFill>
+                  <a:schemeClr val="accent3">
+                    <a:lumMod val="75000"/>
+                  </a:schemeClr>
+                </a:solidFill>
+              </a:rPr>
+              <a:t>LeaveCard</a:t>
+            </a:r>
+            <a:endParaRPr lang="en-SG" sz="1050" b="1" dirty="0">
+              <a:solidFill>
+                <a:schemeClr val="accent3">
+                  <a:lumMod val="75000"/>
+                </a:schemeClr>
+              </a:solidFill>
+            </a:endParaRPr>
+          </a:p>
+        </p:txBody>
+      </p:sp>
+      <p:sp>
+        <p:nvSpPr>
+          <p:cNvPr id="55" name="Freeform 117">
+            <a:extLst>
+              <a:ext uri="{FF2B5EF4-FFF2-40B4-BE49-F238E27FC236}">
+                <a16:creationId xmlns:a16="http://schemas.microsoft.com/office/drawing/2014/main" id="{6BDD0E4C-4AE7-454B-8D2F-D9ADDB7CAF57}"/>
+              </a:ext>
+            </a:extLst>
+          </p:cNvPr>
+          <p:cNvSpPr/>
+          <p:nvPr/>
+        </p:nvSpPr>
+        <p:spPr>
+          <a:xfrm flipV="1">
+            <a:off x="4110475" y="5109560"/>
             <a:ext cx="2642195" cy="101600"/>
           </a:xfrm>
           <a:custGeom>

</xml_diff>